<commit_message>
Added content to Readme
</commit_message>
<xml_diff>
--- a/ApresentacaoOpenFeign.pptx
+++ b/ApresentacaoOpenFeign.pptx
@@ -5501,7 +5501,7 @@
               <a:rPr lang="pt-BR" dirty="0">
                 <a:hlinkClick r:id="rId4"/>
               </a:rPr>
-              <a:t>https://github.com/PedroLacombe</a:t>
+              <a:t>https://github.com/pedrohenriquelacombe</a:t>
             </a:r>
             <a:endParaRPr lang="pt-BR" dirty="0"/>
           </a:p>
@@ -5928,17 +5928,7 @@
               <a:rPr lang="pt-BR" dirty="0">
                 <a:hlinkClick r:id="rId3"/>
               </a:rPr>
-              <a:t>https://app.rocketseat.com.br/me/</a:t>
-            </a:r>
-            <a:r>
-              <a:rPr lang="pt-BR" dirty="0" err="1">
-                <a:hlinkClick r:id="rId3"/>
-              </a:rPr>
-              <a:t>fuskinha</a:t>
-            </a:r>
-            <a:r>
-              <a:rPr lang="pt-BR" dirty="0"/>
-              <a:t>;</a:t>
+              <a:t>https://app.rocketseat.com.br/me/fuskinha</a:t>
             </a:r>
             <a:endParaRPr dirty="0"/>
           </a:p>
@@ -5960,17 +5950,7 @@
               <a:rPr lang="pt-BR" dirty="0">
                 <a:hlinkClick r:id="rId4"/>
               </a:rPr>
-              <a:t>https://www.linkedin.com/in/</a:t>
-            </a:r>
-            <a:r>
-              <a:rPr lang="pt-BR" dirty="0" err="1">
-                <a:hlinkClick r:id="rId4"/>
-              </a:rPr>
-              <a:t>pedrohenriquelacombe</a:t>
-            </a:r>
-            <a:r>
-              <a:rPr lang="pt-BR" dirty="0"/>
-              <a:t>;</a:t>
+              <a:t>https://www.linkedin.com/in/pedrohenriquelacombe</a:t>
             </a:r>
             <a:endParaRPr dirty="0"/>
           </a:p>
@@ -5992,18 +5972,9 @@
               <a:rPr lang="pt-BR" dirty="0">
                 <a:hlinkClick r:id="rId5"/>
               </a:rPr>
-              <a:t>https://github.com/</a:t>
-            </a:r>
-            <a:r>
-              <a:rPr lang="pt-BR" dirty="0" err="1">
-                <a:hlinkClick r:id="rId5"/>
-              </a:rPr>
-              <a:t>PedroLacombe</a:t>
-            </a:r>
-            <a:r>
-              <a:rPr lang="pt-BR" dirty="0"/>
-              <a:t>;</a:t>
-            </a:r>
+              <a:t>https://github.com/pedrohenriquelacombe</a:t>
+            </a:r>
+            <a:endParaRPr lang="pt-BR" dirty="0"/>
           </a:p>
           <a:p>
             <a:pPr marL="914400" lvl="1" indent="-317500" algn="l" rtl="0">
@@ -6216,6 +6187,33 @@
               <a:rPr lang="pt-BR" dirty="0"/>
               <a:t>?</a:t>
             </a:r>
+          </a:p>
+          <a:p>
+            <a:pPr>
+              <a:lnSpc>
+                <a:spcPct val="150000"/>
+              </a:lnSpc>
+            </a:pPr>
+            <a:r>
+              <a:rPr lang="pt-BR" dirty="0"/>
+              <a:t>Repositório do projeto no GitHub:</a:t>
+            </a:r>
+          </a:p>
+          <a:p>
+            <a:pPr lvl="1" indent="-342900">
+              <a:lnSpc>
+                <a:spcPct val="150000"/>
+              </a:lnSpc>
+              <a:buSzPts val="1800"/>
+              <a:buChar char="●"/>
+            </a:pPr>
+            <a:r>
+              <a:rPr lang="pt-BR" dirty="0">
+                <a:hlinkClick r:id="rId3"/>
+              </a:rPr>
+              <a:t>https://github.com/rocketseat-experts-club/spring-cloud-openfeign-2021-07-03</a:t>
+            </a:r>
+            <a:endParaRPr lang="pt-BR" dirty="0"/>
           </a:p>
         </p:txBody>
       </p:sp>

</xml_diff>